<commit_message>
modified:   Best New Location/metrics.ipynb 	new file:   Best New Location/metrics_2.ipynb 	modified:   Business Report.pptx
</commit_message>
<xml_diff>
--- a/Business Report.pptx
+++ b/Business Report.pptx
@@ -4274,7 +4274,7 @@
                 <a:latin typeface="Quattrocento" panose="02020802030000000404" pitchFamily="18" charset="0"/>
                 <a:cs typeface="Arial" pitchFamily="34" charset="0"/>
               </a:rPr>
-              <a:t>Camilla Andreozzi, Glauco Rampone</a:t>
+              <a:t>Glauco Rampone, Camilla Andreozzi</a:t>
             </a:r>
           </a:p>
           <a:p>
@@ -4572,7 +4572,7 @@
                 <a:latin typeface="Quattrocento Sans" panose="020B0502050000020003" pitchFamily="34" charset="0"/>
                 <a:cs typeface="Arial" pitchFamily="34" charset="0"/>
               </a:rPr>
-              <a:t> for </a:t>
+              <a:t> for one or more</a:t>
             </a:r>
             <a:r>
               <a:rPr lang="en-US" sz="3600" b="1" u="sng" dirty="0">
@@ -4580,7 +4580,7 @@
                 <a:latin typeface="Quattrocento Sans" panose="020B0502050000020003" pitchFamily="34" charset="0"/>
                 <a:cs typeface="Arial" pitchFamily="34" charset="0"/>
               </a:rPr>
-              <a:t>two new A&amp;E departments </a:t>
+              <a:t> new A&amp;E departments </a:t>
             </a:r>
             <a:r>
               <a:rPr lang="en-US" sz="3600" dirty="0">
@@ -4938,7 +4938,7 @@
                 <a:latin typeface="Quattrocento Sans" panose="020B0502050000020003" pitchFamily="34" charset="0"/>
                 <a:cs typeface="Arial" pitchFamily="34" charset="0"/>
               </a:rPr>
-              <a:t>: Location was selected using Linear, Poisson and Gamma models. This solution addresses the overarching need for equitable healthcare access. It is designed to ease the pressure on all other departments.</a:t>
+              <a:t>: Location was selected using Linear, Poisson and Gamma models. It is designed to ease the pressure on all other departments.</a:t>
             </a:r>
           </a:p>
           <a:p>
@@ -4959,6 +4959,30 @@
                 <a:spcPct val="110000"/>
               </a:lnSpc>
             </a:pPr>
+            <a:endParaRPr lang="en-US" sz="3600" dirty="0">
+              <a:effectLst/>
+              <a:latin typeface="Quattrocento Sans" panose="020B0502050000020003" pitchFamily="34" charset="0"/>
+              <a:cs typeface="Arial" pitchFamily="34" charset="0"/>
+            </a:endParaRPr>
+          </a:p>
+          <a:p>
+            <a:pPr algn="just">
+              <a:lnSpc>
+                <a:spcPct val="110000"/>
+              </a:lnSpc>
+            </a:pPr>
+            <a:endParaRPr lang="en-US" sz="3200" dirty="0">
+              <a:effectLst/>
+              <a:latin typeface="Quattrocento Sans" panose="020B0502050000020003" pitchFamily="34" charset="0"/>
+              <a:cs typeface="Arial" pitchFamily="34" charset="0"/>
+            </a:endParaRPr>
+          </a:p>
+          <a:p>
+            <a:pPr algn="just">
+              <a:lnSpc>
+                <a:spcPct val="110000"/>
+              </a:lnSpc>
+            </a:pPr>
             <a:r>
               <a:rPr lang="en-US" sz="3600" b="1" dirty="0">
                 <a:effectLst/>
@@ -4990,7 +5014,7 @@
                 <a:latin typeface="Quattrocento Sans" panose="020B0502050000020003" pitchFamily="34" charset="0"/>
                 <a:cs typeface="Arial" pitchFamily="34" charset="0"/>
               </a:rPr>
-              <a:t>Average Wait Time Reduction: </a:t>
+              <a:t>Average Wait Time Reduction: 28 minutes</a:t>
             </a:r>
           </a:p>
           <a:p>
@@ -5061,7 +5085,7 @@
                 <a:latin typeface="Quattrocento Sans" panose="020B0502050000020003" pitchFamily="34" charset="0"/>
                 <a:cs typeface="Arial" pitchFamily="34" charset="0"/>
               </a:rPr>
-              <a:t>: Enhances the overall equity of patient care. Addresses system-wide inefficiencies. </a:t>
+              <a:t>: Maximizes the system’s overall efficiency. Addresses system-wide inefficiencies. </a:t>
             </a:r>
           </a:p>
           <a:p>
@@ -5096,7 +5120,7 @@
                 <a:latin typeface="Quattrocento Sans" panose="020B0502050000020003" pitchFamily="34" charset="0"/>
                 <a:cs typeface="Arial" pitchFamily="34" charset="0"/>
               </a:rPr>
-              <a:t>: Works under the assumption that the main demand will be always concentrated in the center. May not achieve the maximum possible reduction in total wait time.</a:t>
+              <a:t>: Works under the assumption that the main demand will be always concentrated in the center and habits will not change with a new department.</a:t>
             </a:r>
           </a:p>
         </p:txBody>
@@ -5635,7 +5659,7 @@
                 <a:latin typeface="Quattrocento Sans" panose="020B0502050000020003" pitchFamily="34" charset="0"/>
                 <a:cs typeface="Arial" pitchFamily="34" charset="0"/>
               </a:rPr>
-              <a:t>: Achieve the largest total reduction in patient wait times and driving times.</a:t>
+              <a:t>: Achieve a large total reduction in patient wait times and driving times in a specific high demand area.</a:t>
             </a:r>
           </a:p>
           <a:p>
@@ -5670,7 +5694,7 @@
                 <a:latin typeface="Quattrocento Sans" panose="020B0502050000020003" pitchFamily="34" charset="0"/>
                 <a:cs typeface="Arial" pitchFamily="34" charset="0"/>
               </a:rPr>
-              <a:t>: Location was selected using Voronoi mapping and analysis of patient distribution. This solution focuses on areas with the highest patient volumes and longest wait times. Benefits are concentrated in specific regions. </a:t>
+              <a:t>: Location was selected using Voronoi mapping and analysis of patient distribution. This solution addresses the overarching need for equitable healthcare access. Benefits are concentrated in specific regions. </a:t>
             </a:r>
           </a:p>
           <a:p>
@@ -5791,7 +5815,7 @@
                 <a:latin typeface="Quattrocento Sans" panose="020B0502050000020003" pitchFamily="34" charset="0"/>
                 <a:cs typeface="Arial" pitchFamily="34" charset="0"/>
               </a:rPr>
-              <a:t>: Maximizes the system’s overall efficiency. Provides targeted relief in high-demand areas.</a:t>
+              <a:t>: Enhances the overall equity of patient care. Provides targeted relief in high-demand areas.</a:t>
             </a:r>
           </a:p>
           <a:p>

</xml_diff>

<commit_message>
new file:   Best New Location/combination.ipynb 	modified:   Business Report.pptx
</commit_message>
<xml_diff>
--- a/Business Report.pptx
+++ b/Business Report.pptx
@@ -4679,8 +4679,8 @@
         </p:nvSpPr>
         <p:spPr>
           <a:xfrm>
-            <a:off x="929639" y="10135158"/>
-            <a:ext cx="15072571" cy="22415483"/>
+            <a:off x="929639" y="10135159"/>
+            <a:ext cx="15072571" cy="20780680"/>
           </a:xfrm>
           <a:prstGeom prst="rect">
             <a:avLst/>
@@ -4720,408 +4720,6 @@
             <a:endParaRPr lang="en-US" sz="7200" dirty="0">
               <a:latin typeface="+mj-lt"/>
             </a:endParaRPr>
-          </a:p>
-        </p:txBody>
-      </p:sp>
-      <p:sp>
-        <p:nvSpPr>
-          <p:cNvPr id="89" name="TextBox 19">
-            <a:extLst>
-              <a:ext uri="{FF2B5EF4-FFF2-40B4-BE49-F238E27FC236}">
-                <a16:creationId xmlns:a16="http://schemas.microsoft.com/office/drawing/2014/main" id="{9742DD1E-D7E3-4AB1-8A17-D5B59B6AB38B}"/>
-              </a:ext>
-            </a:extLst>
-          </p:cNvPr>
-          <p:cNvSpPr txBox="1">
-            <a:spLocks noChangeArrowheads="1"/>
-          </p:cNvSpPr>
-          <p:nvPr/>
-        </p:nvSpPr>
-        <p:spPr bwMode="auto">
-          <a:xfrm>
-            <a:off x="1259222" y="20578996"/>
-            <a:ext cx="14382924" cy="11625410"/>
-          </a:xfrm>
-          <a:prstGeom prst="rect">
-            <a:avLst/>
-          </a:prstGeom>
-          <a:noFill/>
-          <a:ln>
-            <a:noFill/>
-          </a:ln>
-          <a:extLst>
-            <a:ext uri="{909E8E84-426E-40DD-AFC4-6F175D3DCCD1}">
-              <a14:hiddenFill xmlns:a14="http://schemas.microsoft.com/office/drawing/2010/main">
-                <a:solidFill>
-                  <a:srgbClr val="FFFFFF"/>
-                </a:solidFill>
-              </a14:hiddenFill>
-            </a:ext>
-            <a:ext uri="{91240B29-F687-4F45-9708-019B960494DF}">
-              <a14:hiddenLine xmlns:a14="http://schemas.microsoft.com/office/drawing/2010/main" w="9525">
-                <a:solidFill>
-                  <a:srgbClr val="000000"/>
-                </a:solidFill>
-                <a:miter lim="800000"/>
-                <a:headEnd/>
-                <a:tailEnd/>
-              </a14:hiddenLine>
-            </a:ext>
-          </a:extLst>
-        </p:spPr>
-        <p:txBody>
-          <a:bodyPr wrap="square" lIns="68564" tIns="34282" rIns="68564" bIns="34282">
-            <a:spAutoFit/>
-          </a:bodyPr>
-          <a:lstStyle>
-            <a:defPPr>
-              <a:defRPr kern="1200"/>
-            </a:defPPr>
-            <a:lvl1pPr eaLnBrk="0" hangingPunct="0">
-              <a:defRPr sz="2000">
-                <a:solidFill>
-                  <a:schemeClr val="tx1"/>
-                </a:solidFill>
-                <a:latin typeface="Arial"/>
-                <a:ea typeface="ＭＳ Ｐゴシック" pitchFamily="-106" charset="-128"/>
-              </a:defRPr>
-            </a:lvl1pPr>
-            <a:lvl2pPr eaLnBrk="0" hangingPunct="0">
-              <a:defRPr sz="2000">
-                <a:solidFill>
-                  <a:schemeClr val="tx1"/>
-                </a:solidFill>
-                <a:latin typeface="Arial"/>
-                <a:ea typeface="ＭＳ Ｐゴシック" pitchFamily="-106" charset="-128"/>
-              </a:defRPr>
-            </a:lvl2pPr>
-            <a:lvl3pPr marL="1143000" indent="-228600" eaLnBrk="0" hangingPunct="0">
-              <a:defRPr sz="2000">
-                <a:solidFill>
-                  <a:schemeClr val="tx1"/>
-                </a:solidFill>
-                <a:latin typeface="Arial"/>
-                <a:ea typeface="ＭＳ Ｐゴシック" pitchFamily="-106" charset="-128"/>
-              </a:defRPr>
-            </a:lvl3pPr>
-            <a:lvl4pPr marL="1600200" indent="-228600" eaLnBrk="0" hangingPunct="0">
-              <a:defRPr sz="2000">
-                <a:solidFill>
-                  <a:schemeClr val="tx1"/>
-                </a:solidFill>
-                <a:latin typeface="Arial"/>
-                <a:ea typeface="ＭＳ Ｐゴシック" pitchFamily="-106" charset="-128"/>
-              </a:defRPr>
-            </a:lvl4pPr>
-            <a:lvl5pPr marL="2057400" indent="-228600" eaLnBrk="0" hangingPunct="0">
-              <a:defRPr sz="2000">
-                <a:solidFill>
-                  <a:schemeClr val="tx1"/>
-                </a:solidFill>
-                <a:latin typeface="Arial"/>
-                <a:ea typeface="ＭＳ Ｐゴシック" pitchFamily="-106" charset="-128"/>
-              </a:defRPr>
-            </a:lvl5pPr>
-            <a:lvl6pPr marL="2514600" indent="-228600" eaLnBrk="0" fontAlgn="base" hangingPunct="0">
-              <a:spcBef>
-                <a:spcPct val="0"/>
-              </a:spcBef>
-              <a:spcAft>
-                <a:spcPct val="0"/>
-              </a:spcAft>
-              <a:defRPr sz="2000">
-                <a:solidFill>
-                  <a:schemeClr val="tx1"/>
-                </a:solidFill>
-                <a:latin typeface="Arial"/>
-                <a:ea typeface="ＭＳ Ｐゴシック" pitchFamily="-106" charset="-128"/>
-              </a:defRPr>
-            </a:lvl6pPr>
-            <a:lvl7pPr marL="2971800" indent="-228600" eaLnBrk="0" fontAlgn="base" hangingPunct="0">
-              <a:spcBef>
-                <a:spcPct val="0"/>
-              </a:spcBef>
-              <a:spcAft>
-                <a:spcPct val="0"/>
-              </a:spcAft>
-              <a:defRPr sz="2000">
-                <a:solidFill>
-                  <a:schemeClr val="tx1"/>
-                </a:solidFill>
-                <a:latin typeface="Arial"/>
-                <a:ea typeface="ＭＳ Ｐゴシック" pitchFamily="-106" charset="-128"/>
-              </a:defRPr>
-            </a:lvl7pPr>
-            <a:lvl8pPr marL="3429000" indent="-228600" eaLnBrk="0" fontAlgn="base" hangingPunct="0">
-              <a:spcBef>
-                <a:spcPct val="0"/>
-              </a:spcBef>
-              <a:spcAft>
-                <a:spcPct val="0"/>
-              </a:spcAft>
-              <a:defRPr sz="2000">
-                <a:solidFill>
-                  <a:schemeClr val="tx1"/>
-                </a:solidFill>
-                <a:latin typeface="Arial"/>
-                <a:ea typeface="ＭＳ Ｐゴシック" pitchFamily="-106" charset="-128"/>
-              </a:defRPr>
-            </a:lvl8pPr>
-            <a:lvl9pPr marL="3886200" indent="-228600" eaLnBrk="0" fontAlgn="base" hangingPunct="0">
-              <a:spcBef>
-                <a:spcPct val="0"/>
-              </a:spcBef>
-              <a:spcAft>
-                <a:spcPct val="0"/>
-              </a:spcAft>
-              <a:defRPr sz="2000">
-                <a:solidFill>
-                  <a:schemeClr val="tx1"/>
-                </a:solidFill>
-                <a:latin typeface="Arial"/>
-                <a:ea typeface="ＭＳ Ｐゴシック" pitchFamily="-106" charset="-128"/>
-              </a:defRPr>
-            </a:lvl9pPr>
-          </a:lstStyle>
-          <a:p>
-            <a:pPr algn="just">
-              <a:lnSpc>
-                <a:spcPct val="110000"/>
-              </a:lnSpc>
-            </a:pPr>
-            <a:r>
-              <a:rPr lang="en-US" sz="3600" b="1" dirty="0">
-                <a:effectLst/>
-                <a:latin typeface="Quattrocento Sans" panose="020B0502050000020003" pitchFamily="34" charset="0"/>
-                <a:cs typeface="Arial" pitchFamily="34" charset="0"/>
-              </a:rPr>
-              <a:t>Objective</a:t>
-            </a:r>
-            <a:r>
-              <a:rPr lang="en-US" sz="3600" dirty="0">
-                <a:effectLst/>
-                <a:latin typeface="Quattrocento Sans" panose="020B0502050000020003" pitchFamily="34" charset="0"/>
-                <a:cs typeface="Arial" pitchFamily="34" charset="0"/>
-              </a:rPr>
-              <a:t>: Reduce wait times and driving times for all patients uniformly across the region.</a:t>
-            </a:r>
-          </a:p>
-          <a:p>
-            <a:pPr algn="just">
-              <a:lnSpc>
-                <a:spcPct val="110000"/>
-              </a:lnSpc>
-            </a:pPr>
-            <a:endParaRPr lang="en-US" sz="3600" dirty="0">
-              <a:effectLst/>
-              <a:latin typeface="Quattrocento Sans" panose="020B0502050000020003" pitchFamily="34" charset="0"/>
-              <a:cs typeface="Arial" pitchFamily="34" charset="0"/>
-            </a:endParaRPr>
-          </a:p>
-          <a:p>
-            <a:pPr algn="just">
-              <a:lnSpc>
-                <a:spcPct val="110000"/>
-              </a:lnSpc>
-            </a:pPr>
-            <a:r>
-              <a:rPr lang="en-US" sz="3600" b="1" dirty="0">
-                <a:effectLst/>
-                <a:latin typeface="Quattrocento Sans" panose="020B0502050000020003" pitchFamily="34" charset="0"/>
-                <a:cs typeface="Arial" pitchFamily="34" charset="0"/>
-              </a:rPr>
-              <a:t>Key Insights</a:t>
-            </a:r>
-            <a:r>
-              <a:rPr lang="en-US" sz="3600" dirty="0">
-                <a:effectLst/>
-                <a:latin typeface="Quattrocento Sans" panose="020B0502050000020003" pitchFamily="34" charset="0"/>
-                <a:cs typeface="Arial" pitchFamily="34" charset="0"/>
-              </a:rPr>
-              <a:t>: Location was selected using Linear, Poisson and Gamma models. It is designed to ease the pressure on all other departments.</a:t>
-            </a:r>
-          </a:p>
-          <a:p>
-            <a:pPr algn="just">
-              <a:lnSpc>
-                <a:spcPct val="110000"/>
-              </a:lnSpc>
-            </a:pPr>
-            <a:endParaRPr lang="en-US" sz="3600" dirty="0">
-              <a:effectLst/>
-              <a:latin typeface="Quattrocento Sans" panose="020B0502050000020003" pitchFamily="34" charset="0"/>
-              <a:cs typeface="Arial" pitchFamily="34" charset="0"/>
-            </a:endParaRPr>
-          </a:p>
-          <a:p>
-            <a:pPr algn="just">
-              <a:lnSpc>
-                <a:spcPct val="110000"/>
-              </a:lnSpc>
-            </a:pPr>
-            <a:endParaRPr lang="en-US" sz="3600" dirty="0">
-              <a:effectLst/>
-              <a:latin typeface="Quattrocento Sans" panose="020B0502050000020003" pitchFamily="34" charset="0"/>
-              <a:cs typeface="Arial" pitchFamily="34" charset="0"/>
-            </a:endParaRPr>
-          </a:p>
-          <a:p>
-            <a:pPr algn="just">
-              <a:lnSpc>
-                <a:spcPct val="110000"/>
-              </a:lnSpc>
-            </a:pPr>
-            <a:endParaRPr lang="en-US" sz="3200" dirty="0">
-              <a:effectLst/>
-              <a:latin typeface="Quattrocento Sans" panose="020B0502050000020003" pitchFamily="34" charset="0"/>
-              <a:cs typeface="Arial" pitchFamily="34" charset="0"/>
-            </a:endParaRPr>
-          </a:p>
-          <a:p>
-            <a:pPr algn="just">
-              <a:lnSpc>
-                <a:spcPct val="110000"/>
-              </a:lnSpc>
-            </a:pPr>
-            <a:r>
-              <a:rPr lang="en-US" sz="3600" b="1" dirty="0">
-                <a:effectLst/>
-                <a:latin typeface="Quattrocento Sans" panose="020B0502050000020003" pitchFamily="34" charset="0"/>
-                <a:cs typeface="Arial" pitchFamily="34" charset="0"/>
-              </a:rPr>
-              <a:t>Key Metrics</a:t>
-            </a:r>
-            <a:r>
-              <a:rPr lang="en-US" sz="3600" dirty="0">
-                <a:effectLst/>
-                <a:latin typeface="Quattrocento Sans" panose="020B0502050000020003" pitchFamily="34" charset="0"/>
-                <a:cs typeface="Arial" pitchFamily="34" charset="0"/>
-              </a:rPr>
-              <a:t>: </a:t>
-            </a:r>
-          </a:p>
-          <a:p>
-            <a:pPr marL="571500" indent="-571500" algn="just">
-              <a:lnSpc>
-                <a:spcPct val="110000"/>
-              </a:lnSpc>
-              <a:buFont typeface="Arial" panose="020B0604020202020204" pitchFamily="34" charset="0"/>
-              <a:buChar char="•"/>
-            </a:pPr>
-            <a:r>
-              <a:rPr lang="en-US" sz="3600" dirty="0">
-                <a:effectLst/>
-                <a:latin typeface="Quattrocento Sans" panose="020B0502050000020003" pitchFamily="34" charset="0"/>
-                <a:cs typeface="Arial" pitchFamily="34" charset="0"/>
-              </a:rPr>
-              <a:t>Average Wait Time Reduction: 28 minutes</a:t>
-            </a:r>
-          </a:p>
-          <a:p>
-            <a:pPr marL="571500" indent="-571500" algn="just">
-              <a:lnSpc>
-                <a:spcPct val="110000"/>
-              </a:lnSpc>
-              <a:buFont typeface="Arial" panose="020B0604020202020204" pitchFamily="34" charset="0"/>
-              <a:buChar char="•"/>
-            </a:pPr>
-            <a:r>
-              <a:rPr lang="en-US" sz="3600" dirty="0">
-                <a:effectLst/>
-                <a:latin typeface="Quattrocento Sans" panose="020B0502050000020003" pitchFamily="34" charset="0"/>
-                <a:cs typeface="Arial" pitchFamily="34" charset="0"/>
-              </a:rPr>
-              <a:t>Average Distance to Nearest A&amp;E: 10 km</a:t>
-            </a:r>
-          </a:p>
-          <a:p>
-            <a:pPr marL="571500" indent="-571500" algn="just">
-              <a:lnSpc>
-                <a:spcPct val="110000"/>
-              </a:lnSpc>
-              <a:buFont typeface="Arial" panose="020B0604020202020204" pitchFamily="34" charset="0"/>
-              <a:buChar char="•"/>
-            </a:pPr>
-            <a:r>
-              <a:rPr lang="en-US" sz="3600" dirty="0">
-                <a:effectLst/>
-                <a:latin typeface="Quattrocento Sans" panose="020B0502050000020003" pitchFamily="34" charset="0"/>
-                <a:cs typeface="Arial" pitchFamily="34" charset="0"/>
-              </a:rPr>
-              <a:t>Percentage of patients benefiting from the solution: 100%.</a:t>
-            </a:r>
-          </a:p>
-          <a:p>
-            <a:pPr marL="571500" indent="-571500" algn="just">
-              <a:lnSpc>
-                <a:spcPct val="110000"/>
-              </a:lnSpc>
-              <a:buFont typeface="Arial" panose="020B0604020202020204" pitchFamily="34" charset="0"/>
-              <a:buChar char="•"/>
-            </a:pPr>
-            <a:endParaRPr lang="en-US" sz="3600" dirty="0">
-              <a:effectLst/>
-              <a:latin typeface="Quattrocento Sans" panose="020B0502050000020003" pitchFamily="34" charset="0"/>
-              <a:cs typeface="Arial" pitchFamily="34" charset="0"/>
-            </a:endParaRPr>
-          </a:p>
-          <a:p>
-            <a:pPr algn="just">
-              <a:lnSpc>
-                <a:spcPct val="110000"/>
-              </a:lnSpc>
-            </a:pPr>
-            <a:r>
-              <a:rPr lang="en-US" sz="3600" b="1" dirty="0">
-                <a:effectLst/>
-                <a:latin typeface="Quattrocento Sans" panose="020B0502050000020003" pitchFamily="34" charset="0"/>
-                <a:cs typeface="Arial" pitchFamily="34" charset="0"/>
-              </a:rPr>
-              <a:t>Benefits</a:t>
-            </a:r>
-            <a:r>
-              <a:rPr lang="en-US" sz="3600" dirty="0">
-                <a:effectLst/>
-                <a:latin typeface="Quattrocento Sans" panose="020B0502050000020003" pitchFamily="34" charset="0"/>
-                <a:cs typeface="Arial" pitchFamily="34" charset="0"/>
-              </a:rPr>
-              <a:t>: Maximizes the system’s overall efficiency. Addresses system-wide inefficiencies. </a:t>
-            </a:r>
-          </a:p>
-          <a:p>
-            <a:pPr algn="just">
-              <a:lnSpc>
-                <a:spcPct val="110000"/>
-              </a:lnSpc>
-            </a:pPr>
-            <a:endParaRPr lang="en-US" sz="3600" dirty="0">
-              <a:effectLst/>
-              <a:latin typeface="Quattrocento Sans" panose="020B0502050000020003" pitchFamily="34" charset="0"/>
-              <a:cs typeface="Arial" pitchFamily="34" charset="0"/>
-            </a:endParaRPr>
-          </a:p>
-          <a:p>
-            <a:pPr algn="just">
-              <a:lnSpc>
-                <a:spcPct val="110000"/>
-              </a:lnSpc>
-            </a:pPr>
-            <a:r>
-              <a:rPr lang="en-US" sz="3600" b="1" dirty="0">
-                <a:effectLst/>
-                <a:latin typeface="Quattrocento Sans" panose="020B0502050000020003" pitchFamily="34" charset="0"/>
-                <a:cs typeface="Arial" pitchFamily="34" charset="0"/>
-              </a:rPr>
-              <a:t>Challenges</a:t>
-            </a:r>
-            <a:r>
-              <a:rPr lang="en-US" sz="3600" dirty="0">
-                <a:effectLst/>
-                <a:latin typeface="Quattrocento Sans" panose="020B0502050000020003" pitchFamily="34" charset="0"/>
-                <a:cs typeface="Arial" pitchFamily="34" charset="0"/>
-              </a:rPr>
-              <a:t>: Works under the assumption that the main demand will be always concentrated in the center and habits will not change with a new department.</a:t>
-            </a:r>
           </a:p>
         </p:txBody>
       </p:sp>
@@ -5177,7 +4775,7 @@
                 <a:effectLst/>
                 <a:latin typeface="Quattrocento" panose="02020802030000000404" pitchFamily="18" charset="0"/>
               </a:rPr>
-              <a:t>Centrally Located A&amp;E Department</a:t>
+              <a:t>Centrally Located A&amp;E Department (Heuristic Approach)</a:t>
             </a:r>
           </a:p>
         </p:txBody>
@@ -5196,8 +4794,8 @@
         </p:nvSpPr>
         <p:spPr>
           <a:xfrm>
-            <a:off x="914399" y="33756041"/>
-            <a:ext cx="31089601" cy="9202267"/>
+            <a:off x="972848" y="32100304"/>
+            <a:ext cx="31089601" cy="10840591"/>
           </a:xfrm>
           <a:prstGeom prst="rect">
             <a:avLst/>
@@ -5233,80 +4831,6 @@
             </a:defPPr>
           </a:lstStyle>
           <a:p>
-            <a:pPr algn="just">
-              <a:lnSpc>
-                <a:spcPct val="110000"/>
-              </a:lnSpc>
-            </a:pPr>
-            <a:r>
-              <a:rPr lang="en-US" sz="7200" b="1" dirty="0">
-                <a:effectLst/>
-                <a:latin typeface="Quattrocento Sans" panose="020B0502050000020003" pitchFamily="34" charset="0"/>
-                <a:cs typeface="Arial" pitchFamily="34" charset="0"/>
-              </a:rPr>
-              <a:t>Key Metrics</a:t>
-            </a:r>
-            <a:r>
-              <a:rPr lang="en-US" sz="7200" dirty="0">
-                <a:effectLst/>
-                <a:latin typeface="Quattrocento Sans" panose="020B0502050000020003" pitchFamily="34" charset="0"/>
-                <a:cs typeface="Arial" pitchFamily="34" charset="0"/>
-              </a:rPr>
-              <a:t>: </a:t>
-            </a:r>
-          </a:p>
-          <a:p>
-            <a:pPr marL="571500" indent="-571500" algn="just">
-              <a:lnSpc>
-                <a:spcPct val="110000"/>
-              </a:lnSpc>
-              <a:buFont typeface="Arial" panose="020B0604020202020204" pitchFamily="34" charset="0"/>
-              <a:buChar char="•"/>
-            </a:pPr>
-            <a:r>
-              <a:rPr lang="en-US" sz="7200" dirty="0">
-                <a:effectLst/>
-                <a:latin typeface="Quattrocento Sans" panose="020B0502050000020003" pitchFamily="34" charset="0"/>
-                <a:cs typeface="Arial" pitchFamily="34" charset="0"/>
-              </a:rPr>
-              <a:t>Average Wait Time Reduction: 15minutes</a:t>
-            </a:r>
-          </a:p>
-          <a:p>
-            <a:pPr marL="571500" indent="-571500" algn="just">
-              <a:lnSpc>
-                <a:spcPct val="110000"/>
-              </a:lnSpc>
-              <a:buFont typeface="Arial" panose="020B0604020202020204" pitchFamily="34" charset="0"/>
-              <a:buChar char="•"/>
-            </a:pPr>
-            <a:r>
-              <a:rPr lang="en-US" sz="7200" dirty="0">
-                <a:effectLst/>
-                <a:latin typeface="Quattrocento Sans" panose="020B0502050000020003" pitchFamily="34" charset="0"/>
-                <a:cs typeface="Arial" pitchFamily="34" charset="0"/>
-              </a:rPr>
-              <a:t>Percentage of Patients with Reduced Wait Time: 95%</a:t>
-            </a:r>
-          </a:p>
-          <a:p>
-            <a:pPr marL="571500" indent="-571500" algn="just">
-              <a:lnSpc>
-                <a:spcPct val="110000"/>
-              </a:lnSpc>
-              <a:buFont typeface="Arial" panose="020B0604020202020204" pitchFamily="34" charset="0"/>
-              <a:buChar char="•"/>
-            </a:pPr>
-            <a:r>
-              <a:rPr lang="en-US" sz="7200" dirty="0">
-                <a:effectLst/>
-                <a:latin typeface="Quattrocento Sans" panose="020B0502050000020003" pitchFamily="34" charset="0"/>
-                <a:cs typeface="Arial" pitchFamily="34" charset="0"/>
-              </a:rPr>
-              <a:t>Average Distance to Nearest A&amp;E: 10 km</a:t>
-            </a:r>
-          </a:p>
-          <a:p>
             <a:pPr algn="ctr"/>
             <a:endParaRPr lang="en-US" sz="7200" dirty="0">
               <a:latin typeface="+mj-lt"/>
@@ -5330,7 +4854,7 @@
         </p:nvSpPr>
         <p:spPr bwMode="auto">
           <a:xfrm>
-            <a:off x="908536" y="32939159"/>
+            <a:off x="912557" y="31203316"/>
             <a:ext cx="31089601" cy="914400"/>
           </a:xfrm>
           <a:prstGeom prst="snipRoundRect">
@@ -5388,7 +4912,7 @@
         <p:spPr>
           <a:xfrm>
             <a:off x="16974638" y="10494840"/>
-            <a:ext cx="15072571" cy="22055802"/>
+            <a:ext cx="15072571" cy="20420999"/>
           </a:xfrm>
           <a:prstGeom prst="rect">
             <a:avLst/>
@@ -5447,8 +4971,8 @@
         </p:nvSpPr>
         <p:spPr bwMode="auto">
           <a:xfrm>
-            <a:off x="17245774" y="18069692"/>
-            <a:ext cx="14382924" cy="14063001"/>
+            <a:off x="17272571" y="17588860"/>
+            <a:ext cx="14382924" cy="12844206"/>
           </a:xfrm>
           <a:prstGeom prst="rect">
             <a:avLst/>
@@ -5694,7 +5218,7 @@
                 <a:latin typeface="Quattrocento Sans" panose="020B0502050000020003" pitchFamily="34" charset="0"/>
                 <a:cs typeface="Arial" pitchFamily="34" charset="0"/>
               </a:rPr>
-              <a:t>: Location was selected using Voronoi mapping and analysis of patient distribution. This solution addresses the overarching need for equitable healthcare access. Benefits are concentrated in specific regions. </a:t>
+              <a:t>: Location was selected using Voronoi mapping and analysis of patient distribution. This solution addresses the overarching need for equitable healthcare access. </a:t>
             </a:r>
           </a:p>
           <a:p>
@@ -5746,7 +5270,7 @@
                 <a:latin typeface="Quattrocento Sans" panose="020B0502050000020003" pitchFamily="34" charset="0"/>
                 <a:cs typeface="Arial" pitchFamily="34" charset="0"/>
               </a:rPr>
-              <a:t>Average Wait Time Reduction: 25,000 minutes </a:t>
+              <a:t>Average Wait Time Reduction: 13 minutes </a:t>
             </a:r>
           </a:p>
           <a:p>
@@ -5763,24 +5287,7 @@
                 <a:latin typeface="Quattrocento Sans" panose="020B0502050000020003" pitchFamily="34" charset="0"/>
                 <a:cs typeface="Arial" pitchFamily="34" charset="0"/>
               </a:rPr>
-              <a:t> Average Distance to Nearest A&amp;E: 8 km</a:t>
-            </a:r>
-          </a:p>
-          <a:p>
-            <a:pPr marL="571500" indent="-571500" algn="just">
-              <a:lnSpc>
-                <a:spcPct val="110000"/>
-              </a:lnSpc>
-              <a:buFont typeface="Arial" panose="020B0604020202020204" pitchFamily="34" charset="0"/>
-              <a:buChar char="•"/>
-            </a:pPr>
-            <a:r>
-              <a:rPr lang="en-US" sz="3600" dirty="0">
-                <a:effectLst/>
-                <a:latin typeface="Quattrocento Sans" panose="020B0502050000020003" pitchFamily="34" charset="0"/>
-                <a:cs typeface="Arial" pitchFamily="34" charset="0"/>
-              </a:rPr>
-              <a:t>Percentage of patients benefiting from the solution: 100%.</a:t>
+              <a:t> Average Distance to Nearest A&amp;E: </a:t>
             </a:r>
           </a:p>
           <a:p>
@@ -5850,7 +5357,7 @@
                 <a:latin typeface="Quattrocento Sans" panose="020B0502050000020003" pitchFamily="34" charset="0"/>
                 <a:cs typeface="Arial" pitchFamily="34" charset="0"/>
               </a:rPr>
-              <a:t>: The model assumes that patients always choose the nearest department. As a result, patients in the city center may not experience substantial benefits under this assumption.</a:t>
+              <a:t>: The model assumes that patients always choose the nearest department. Under this assumption, patients in the city center may not experience substantial benefits.</a:t>
             </a:r>
           </a:p>
         </p:txBody>
@@ -5907,7 +5414,7 @@
                 <a:effectLst/>
                 <a:latin typeface="Quattrocento" panose="02020802030000000404" pitchFamily="18" charset="0"/>
               </a:rPr>
-              <a:t>Strategically Located A&amp;E Department</a:t>
+              <a:t>Strategically Located A&amp;E Department (Empirical Approach)</a:t>
             </a:r>
           </a:p>
         </p:txBody>
@@ -5934,7 +5441,7 @@
         </p:blipFill>
         <p:spPr>
           <a:xfrm>
-            <a:off x="18592800" y="13314318"/>
+            <a:off x="18592800" y="12516031"/>
             <a:ext cx="11018913" cy="6872685"/>
           </a:xfrm>
           <a:prstGeom prst="rect">
@@ -5956,7 +5463,7 @@
         </p:nvSpPr>
         <p:spPr>
           <a:xfrm>
-            <a:off x="1745084" y="11633992"/>
+            <a:off x="5097884" y="11462588"/>
             <a:ext cx="6705600" cy="646331"/>
           </a:xfrm>
           <a:prstGeom prst="rect">
@@ -5976,7 +5483,15 @@
                 <a:latin typeface="Quattrocento Sans" panose="020B0502050000020003" pitchFamily="34" charset="0"/>
                 <a:cs typeface="Arial" pitchFamily="34" charset="0"/>
               </a:rPr>
-              <a:t>Coordinates:</a:t>
+              <a:t>Coordinates: </a:t>
+            </a:r>
+            <a:r>
+              <a:rPr lang="en-US" sz="3600" dirty="0">
+                <a:effectLst/>
+                <a:latin typeface="Quattrocento Sans" panose="020B0502050000020003" pitchFamily="34" charset="0"/>
+                <a:cs typeface="Arial" pitchFamily="34" charset="0"/>
+              </a:rPr>
+              <a:t>(33537, 111593)</a:t>
             </a:r>
             <a:endParaRPr lang="it-IT" dirty="0"/>
           </a:p>
@@ -5996,7 +5511,7 @@
         </p:nvSpPr>
         <p:spPr>
           <a:xfrm>
-            <a:off x="17678422" y="11537174"/>
+            <a:off x="21793200" y="11462588"/>
             <a:ext cx="14740868" cy="646331"/>
           </a:xfrm>
           <a:prstGeom prst="rect">
@@ -6024,12 +5539,982 @@
                 <a:latin typeface="Quattrocento Sans" panose="020B0502050000020003" pitchFamily="34" charset="0"/>
                 <a:cs typeface="Arial" pitchFamily="34" charset="0"/>
               </a:rPr>
-              <a:t>:</a:t>
+              <a:t>: (10640, 105691)  </a:t>
             </a:r>
             <a:endParaRPr lang="it-IT" dirty="0"/>
           </a:p>
         </p:txBody>
       </p:sp>
+      <p:pic>
+        <p:nvPicPr>
+          <p:cNvPr id="6" name="Immagine 5" descr="Immagine che contiene testo, schermata, diagramma, Carattere&#10;&#10;Descrizione generata automaticamente">
+            <a:extLst>
+              <a:ext uri="{FF2B5EF4-FFF2-40B4-BE49-F238E27FC236}">
+                <a16:creationId xmlns:a16="http://schemas.microsoft.com/office/drawing/2014/main" id="{FD6A0802-FA08-43C6-3BBD-CEA9A6CBE925}"/>
+              </a:ext>
+            </a:extLst>
+          </p:cNvPr>
+          <p:cNvPicPr>
+            <a:picLocks noChangeAspect="1"/>
+          </p:cNvPicPr>
+          <p:nvPr/>
+        </p:nvPicPr>
+        <p:blipFill>
+          <a:blip r:embed="rId4">
+            <a:extLst>
+              <a:ext uri="{28A0092B-C50C-407E-A947-70E740481C1C}">
+                <a14:useLocalDpi xmlns:a14="http://schemas.microsoft.com/office/drawing/2010/main" val="0"/>
+              </a:ext>
+            </a:extLst>
+          </a:blip>
+          <a:stretch>
+            <a:fillRect/>
+          </a:stretch>
+        </p:blipFill>
+        <p:spPr>
+          <a:xfrm>
+            <a:off x="2743200" y="12516031"/>
+            <a:ext cx="10925726" cy="7804089"/>
+          </a:xfrm>
+          <a:prstGeom prst="rect">
+            <a:avLst/>
+          </a:prstGeom>
+        </p:spPr>
+      </p:pic>
+      <p:sp>
+        <p:nvSpPr>
+          <p:cNvPr id="14" name="TextBox 19">
+            <a:extLst>
+              <a:ext uri="{FF2B5EF4-FFF2-40B4-BE49-F238E27FC236}">
+                <a16:creationId xmlns:a16="http://schemas.microsoft.com/office/drawing/2014/main" id="{E521C3AE-EE7E-E3BA-2A22-F1469453ABC3}"/>
+              </a:ext>
+            </a:extLst>
+          </p:cNvPr>
+          <p:cNvSpPr txBox="1">
+            <a:spLocks noChangeArrowheads="1"/>
+          </p:cNvSpPr>
+          <p:nvPr/>
+        </p:nvSpPr>
+        <p:spPr bwMode="auto">
+          <a:xfrm>
+            <a:off x="1289702" y="20683452"/>
+            <a:ext cx="14382924" cy="9797218"/>
+          </a:xfrm>
+          <a:prstGeom prst="rect">
+            <a:avLst/>
+          </a:prstGeom>
+          <a:noFill/>
+          <a:ln>
+            <a:noFill/>
+          </a:ln>
+          <a:extLst>
+            <a:ext uri="{909E8E84-426E-40DD-AFC4-6F175D3DCCD1}">
+              <a14:hiddenFill xmlns:a14="http://schemas.microsoft.com/office/drawing/2010/main">
+                <a:solidFill>
+                  <a:srgbClr val="FFFFFF"/>
+                </a:solidFill>
+              </a14:hiddenFill>
+            </a:ext>
+            <a:ext uri="{91240B29-F687-4F45-9708-019B960494DF}">
+              <a14:hiddenLine xmlns:a14="http://schemas.microsoft.com/office/drawing/2010/main" w="9525">
+                <a:solidFill>
+                  <a:srgbClr val="000000"/>
+                </a:solidFill>
+                <a:miter lim="800000"/>
+                <a:headEnd/>
+                <a:tailEnd/>
+              </a14:hiddenLine>
+            </a:ext>
+          </a:extLst>
+        </p:spPr>
+        <p:txBody>
+          <a:bodyPr wrap="square" lIns="68564" tIns="34282" rIns="68564" bIns="34282">
+            <a:spAutoFit/>
+          </a:bodyPr>
+          <a:lstStyle>
+            <a:defPPr>
+              <a:defRPr kern="1200"/>
+            </a:defPPr>
+            <a:lvl1pPr eaLnBrk="0" hangingPunct="0">
+              <a:defRPr sz="2000">
+                <a:solidFill>
+                  <a:schemeClr val="tx1"/>
+                </a:solidFill>
+                <a:latin typeface="Arial"/>
+                <a:ea typeface="ＭＳ Ｐゴシック" pitchFamily="-106" charset="-128"/>
+              </a:defRPr>
+            </a:lvl1pPr>
+            <a:lvl2pPr eaLnBrk="0" hangingPunct="0">
+              <a:defRPr sz="2000">
+                <a:solidFill>
+                  <a:schemeClr val="tx1"/>
+                </a:solidFill>
+                <a:latin typeface="Arial"/>
+                <a:ea typeface="ＭＳ Ｐゴシック" pitchFamily="-106" charset="-128"/>
+              </a:defRPr>
+            </a:lvl2pPr>
+            <a:lvl3pPr marL="1143000" indent="-228600" eaLnBrk="0" hangingPunct="0">
+              <a:defRPr sz="2000">
+                <a:solidFill>
+                  <a:schemeClr val="tx1"/>
+                </a:solidFill>
+                <a:latin typeface="Arial"/>
+                <a:ea typeface="ＭＳ Ｐゴシック" pitchFamily="-106" charset="-128"/>
+              </a:defRPr>
+            </a:lvl3pPr>
+            <a:lvl4pPr marL="1600200" indent="-228600" eaLnBrk="0" hangingPunct="0">
+              <a:defRPr sz="2000">
+                <a:solidFill>
+                  <a:schemeClr val="tx1"/>
+                </a:solidFill>
+                <a:latin typeface="Arial"/>
+                <a:ea typeface="ＭＳ Ｐゴシック" pitchFamily="-106" charset="-128"/>
+              </a:defRPr>
+            </a:lvl4pPr>
+            <a:lvl5pPr marL="2057400" indent="-228600" eaLnBrk="0" hangingPunct="0">
+              <a:defRPr sz="2000">
+                <a:solidFill>
+                  <a:schemeClr val="tx1"/>
+                </a:solidFill>
+                <a:latin typeface="Arial"/>
+                <a:ea typeface="ＭＳ Ｐゴシック" pitchFamily="-106" charset="-128"/>
+              </a:defRPr>
+            </a:lvl5pPr>
+            <a:lvl6pPr marL="2514600" indent="-228600" eaLnBrk="0" fontAlgn="base" hangingPunct="0">
+              <a:spcBef>
+                <a:spcPct val="0"/>
+              </a:spcBef>
+              <a:spcAft>
+                <a:spcPct val="0"/>
+              </a:spcAft>
+              <a:defRPr sz="2000">
+                <a:solidFill>
+                  <a:schemeClr val="tx1"/>
+                </a:solidFill>
+                <a:latin typeface="Arial"/>
+                <a:ea typeface="ＭＳ Ｐゴシック" pitchFamily="-106" charset="-128"/>
+              </a:defRPr>
+            </a:lvl6pPr>
+            <a:lvl7pPr marL="2971800" indent="-228600" eaLnBrk="0" fontAlgn="base" hangingPunct="0">
+              <a:spcBef>
+                <a:spcPct val="0"/>
+              </a:spcBef>
+              <a:spcAft>
+                <a:spcPct val="0"/>
+              </a:spcAft>
+              <a:defRPr sz="2000">
+                <a:solidFill>
+                  <a:schemeClr val="tx1"/>
+                </a:solidFill>
+                <a:latin typeface="Arial"/>
+                <a:ea typeface="ＭＳ Ｐゴシック" pitchFamily="-106" charset="-128"/>
+              </a:defRPr>
+            </a:lvl7pPr>
+            <a:lvl8pPr marL="3429000" indent="-228600" eaLnBrk="0" fontAlgn="base" hangingPunct="0">
+              <a:spcBef>
+                <a:spcPct val="0"/>
+              </a:spcBef>
+              <a:spcAft>
+                <a:spcPct val="0"/>
+              </a:spcAft>
+              <a:defRPr sz="2000">
+                <a:solidFill>
+                  <a:schemeClr val="tx1"/>
+                </a:solidFill>
+                <a:latin typeface="Arial"/>
+                <a:ea typeface="ＭＳ Ｐゴシック" pitchFamily="-106" charset="-128"/>
+              </a:defRPr>
+            </a:lvl8pPr>
+            <a:lvl9pPr marL="3886200" indent="-228600" eaLnBrk="0" fontAlgn="base" hangingPunct="0">
+              <a:spcBef>
+                <a:spcPct val="0"/>
+              </a:spcBef>
+              <a:spcAft>
+                <a:spcPct val="0"/>
+              </a:spcAft>
+              <a:defRPr sz="2000">
+                <a:solidFill>
+                  <a:schemeClr val="tx1"/>
+                </a:solidFill>
+                <a:latin typeface="Arial"/>
+                <a:ea typeface="ＭＳ Ｐゴシック" pitchFamily="-106" charset="-128"/>
+              </a:defRPr>
+            </a:lvl9pPr>
+          </a:lstStyle>
+          <a:p>
+            <a:pPr algn="just">
+              <a:lnSpc>
+                <a:spcPct val="110000"/>
+              </a:lnSpc>
+            </a:pPr>
+            <a:r>
+              <a:rPr lang="en-US" sz="3600" b="1" dirty="0">
+                <a:effectLst/>
+                <a:latin typeface="Quattrocento Sans" panose="020B0502050000020003" pitchFamily="34" charset="0"/>
+                <a:cs typeface="Arial" pitchFamily="34" charset="0"/>
+              </a:rPr>
+              <a:t>Objective</a:t>
+            </a:r>
+            <a:r>
+              <a:rPr lang="en-US" sz="3600" dirty="0">
+                <a:effectLst/>
+                <a:latin typeface="Quattrocento Sans" panose="020B0502050000020003" pitchFamily="34" charset="0"/>
+                <a:cs typeface="Arial" pitchFamily="34" charset="0"/>
+              </a:rPr>
+              <a:t>: Reduce wait times and driving times for all patients uniformly across the region.</a:t>
+            </a:r>
+          </a:p>
+          <a:p>
+            <a:pPr algn="just">
+              <a:lnSpc>
+                <a:spcPct val="110000"/>
+              </a:lnSpc>
+            </a:pPr>
+            <a:endParaRPr lang="en-US" sz="3600" dirty="0">
+              <a:effectLst/>
+              <a:latin typeface="Quattrocento Sans" panose="020B0502050000020003" pitchFamily="34" charset="0"/>
+              <a:cs typeface="Arial" pitchFamily="34" charset="0"/>
+            </a:endParaRPr>
+          </a:p>
+          <a:p>
+            <a:pPr algn="just">
+              <a:lnSpc>
+                <a:spcPct val="110000"/>
+              </a:lnSpc>
+            </a:pPr>
+            <a:r>
+              <a:rPr lang="en-US" sz="3600" b="1" dirty="0">
+                <a:effectLst/>
+                <a:latin typeface="Quattrocento Sans" panose="020B0502050000020003" pitchFamily="34" charset="0"/>
+                <a:cs typeface="Arial" pitchFamily="34" charset="0"/>
+              </a:rPr>
+              <a:t>Key Insights</a:t>
+            </a:r>
+            <a:r>
+              <a:rPr lang="en-US" sz="3600" dirty="0">
+                <a:effectLst/>
+                <a:latin typeface="Quattrocento Sans" panose="020B0502050000020003" pitchFamily="34" charset="0"/>
+                <a:cs typeface="Arial" pitchFamily="34" charset="0"/>
+              </a:rPr>
+              <a:t>: Location was selected using Linear, Poisson and Gamma models. It is designed to ease the pressure on all other departments.</a:t>
+            </a:r>
+          </a:p>
+          <a:p>
+            <a:pPr algn="just">
+              <a:lnSpc>
+                <a:spcPct val="110000"/>
+              </a:lnSpc>
+            </a:pPr>
+            <a:endParaRPr lang="en-US" sz="3600" dirty="0">
+              <a:effectLst/>
+              <a:latin typeface="Quattrocento Sans" panose="020B0502050000020003" pitchFamily="34" charset="0"/>
+              <a:cs typeface="Arial" pitchFamily="34" charset="0"/>
+            </a:endParaRPr>
+          </a:p>
+          <a:p>
+            <a:pPr algn="just">
+              <a:lnSpc>
+                <a:spcPct val="110000"/>
+              </a:lnSpc>
+            </a:pPr>
+            <a:r>
+              <a:rPr lang="en-US" sz="3600" b="1" dirty="0">
+                <a:effectLst/>
+                <a:latin typeface="Quattrocento Sans" panose="020B0502050000020003" pitchFamily="34" charset="0"/>
+                <a:cs typeface="Arial" pitchFamily="34" charset="0"/>
+              </a:rPr>
+              <a:t>Key Metrics</a:t>
+            </a:r>
+            <a:r>
+              <a:rPr lang="en-US" sz="3600" dirty="0">
+                <a:effectLst/>
+                <a:latin typeface="Quattrocento Sans" panose="020B0502050000020003" pitchFamily="34" charset="0"/>
+                <a:cs typeface="Arial" pitchFamily="34" charset="0"/>
+              </a:rPr>
+              <a:t>: </a:t>
+            </a:r>
+          </a:p>
+          <a:p>
+            <a:pPr marL="571500" indent="-571500" algn="just">
+              <a:lnSpc>
+                <a:spcPct val="110000"/>
+              </a:lnSpc>
+              <a:buFont typeface="Arial" panose="020B0604020202020204" pitchFamily="34" charset="0"/>
+              <a:buChar char="•"/>
+            </a:pPr>
+            <a:r>
+              <a:rPr lang="en-US" sz="3600" dirty="0">
+                <a:effectLst/>
+                <a:latin typeface="Quattrocento Sans" panose="020B0502050000020003" pitchFamily="34" charset="0"/>
+                <a:cs typeface="Arial" pitchFamily="34" charset="0"/>
+              </a:rPr>
+              <a:t>Average Wait Time Reduction: 28 minutes</a:t>
+            </a:r>
+          </a:p>
+          <a:p>
+            <a:pPr marL="571500" indent="-571500" algn="just">
+              <a:lnSpc>
+                <a:spcPct val="110000"/>
+              </a:lnSpc>
+              <a:buFont typeface="Arial" panose="020B0604020202020204" pitchFamily="34" charset="0"/>
+              <a:buChar char="•"/>
+            </a:pPr>
+            <a:r>
+              <a:rPr lang="en-US" sz="3600" dirty="0">
+                <a:effectLst/>
+                <a:latin typeface="Quattrocento Sans" panose="020B0502050000020003" pitchFamily="34" charset="0"/>
+                <a:cs typeface="Arial" pitchFamily="34" charset="0"/>
+              </a:rPr>
+              <a:t>Average Distance to Nearest A&amp;E: </a:t>
+            </a:r>
+          </a:p>
+          <a:p>
+            <a:pPr algn="just">
+              <a:lnSpc>
+                <a:spcPct val="110000"/>
+              </a:lnSpc>
+            </a:pPr>
+            <a:endParaRPr lang="en-US" sz="3600" dirty="0">
+              <a:effectLst/>
+              <a:latin typeface="Quattrocento Sans" panose="020B0502050000020003" pitchFamily="34" charset="0"/>
+              <a:cs typeface="Arial" pitchFamily="34" charset="0"/>
+            </a:endParaRPr>
+          </a:p>
+          <a:p>
+            <a:pPr algn="just">
+              <a:lnSpc>
+                <a:spcPct val="110000"/>
+              </a:lnSpc>
+            </a:pPr>
+            <a:r>
+              <a:rPr lang="en-US" sz="3600" b="1" dirty="0">
+                <a:effectLst/>
+                <a:latin typeface="Quattrocento Sans" panose="020B0502050000020003" pitchFamily="34" charset="0"/>
+                <a:cs typeface="Arial" pitchFamily="34" charset="0"/>
+              </a:rPr>
+              <a:t>Benefits</a:t>
+            </a:r>
+            <a:r>
+              <a:rPr lang="en-US" sz="3600" dirty="0">
+                <a:effectLst/>
+                <a:latin typeface="Quattrocento Sans" panose="020B0502050000020003" pitchFamily="34" charset="0"/>
+                <a:cs typeface="Arial" pitchFamily="34" charset="0"/>
+              </a:rPr>
+              <a:t>: Maximizes the system’s overall efficiency. Addresses system-wide inefficiencies. </a:t>
+            </a:r>
+          </a:p>
+          <a:p>
+            <a:pPr algn="just">
+              <a:lnSpc>
+                <a:spcPct val="110000"/>
+              </a:lnSpc>
+            </a:pPr>
+            <a:endParaRPr lang="en-US" sz="3600" dirty="0">
+              <a:effectLst/>
+              <a:latin typeface="Quattrocento Sans" panose="020B0502050000020003" pitchFamily="34" charset="0"/>
+              <a:cs typeface="Arial" pitchFamily="34" charset="0"/>
+            </a:endParaRPr>
+          </a:p>
+          <a:p>
+            <a:pPr algn="just">
+              <a:lnSpc>
+                <a:spcPct val="110000"/>
+              </a:lnSpc>
+            </a:pPr>
+            <a:r>
+              <a:rPr lang="en-US" sz="3600" b="1" dirty="0">
+                <a:effectLst/>
+                <a:latin typeface="Quattrocento Sans" panose="020B0502050000020003" pitchFamily="34" charset="0"/>
+                <a:cs typeface="Arial" pitchFamily="34" charset="0"/>
+              </a:rPr>
+              <a:t>Challenges</a:t>
+            </a:r>
+            <a:r>
+              <a:rPr lang="en-US" sz="3600" dirty="0">
+                <a:effectLst/>
+                <a:latin typeface="Quattrocento Sans" panose="020B0502050000020003" pitchFamily="34" charset="0"/>
+                <a:cs typeface="Arial" pitchFamily="34" charset="0"/>
+              </a:rPr>
+              <a:t>: Works under the assumption that the main demand is concentrated in the center and habits will not change with a new department.</a:t>
+            </a:r>
+          </a:p>
+        </p:txBody>
+      </p:sp>
+      <p:sp>
+        <p:nvSpPr>
+          <p:cNvPr id="13" name="TextBox 19">
+            <a:extLst>
+              <a:ext uri="{FF2B5EF4-FFF2-40B4-BE49-F238E27FC236}">
+                <a16:creationId xmlns:a16="http://schemas.microsoft.com/office/drawing/2014/main" id="{44B8C02A-3B2A-4733-03ED-C026D7BFD138}"/>
+              </a:ext>
+            </a:extLst>
+          </p:cNvPr>
+          <p:cNvSpPr txBox="1">
+            <a:spLocks noChangeArrowheads="1"/>
+          </p:cNvSpPr>
+          <p:nvPr/>
+        </p:nvSpPr>
+        <p:spPr bwMode="auto">
+          <a:xfrm>
+            <a:off x="1289702" y="32720345"/>
+            <a:ext cx="8875378" cy="9051180"/>
+          </a:xfrm>
+          <a:prstGeom prst="rect">
+            <a:avLst/>
+          </a:prstGeom>
+          <a:noFill/>
+          <a:ln>
+            <a:noFill/>
+          </a:ln>
+          <a:extLst>
+            <a:ext uri="{909E8E84-426E-40DD-AFC4-6F175D3DCCD1}">
+              <a14:hiddenFill xmlns:a14="http://schemas.microsoft.com/office/drawing/2010/main">
+                <a:solidFill>
+                  <a:srgbClr val="FFFFFF"/>
+                </a:solidFill>
+              </a14:hiddenFill>
+            </a:ext>
+            <a:ext uri="{91240B29-F687-4F45-9708-019B960494DF}">
+              <a14:hiddenLine xmlns:a14="http://schemas.microsoft.com/office/drawing/2010/main" w="9525">
+                <a:solidFill>
+                  <a:srgbClr val="000000"/>
+                </a:solidFill>
+                <a:miter lim="800000"/>
+                <a:headEnd/>
+                <a:tailEnd/>
+              </a14:hiddenLine>
+            </a:ext>
+          </a:extLst>
+        </p:spPr>
+        <p:txBody>
+          <a:bodyPr wrap="square" lIns="68564" tIns="34282" rIns="68564" bIns="34282">
+            <a:spAutoFit/>
+          </a:bodyPr>
+          <a:lstStyle>
+            <a:defPPr>
+              <a:defRPr kern="1200"/>
+            </a:defPPr>
+            <a:lvl1pPr eaLnBrk="0" hangingPunct="0">
+              <a:defRPr sz="2000">
+                <a:solidFill>
+                  <a:schemeClr val="tx1"/>
+                </a:solidFill>
+                <a:latin typeface="Arial"/>
+                <a:ea typeface="ＭＳ Ｐゴシック" pitchFamily="-106" charset="-128"/>
+              </a:defRPr>
+            </a:lvl1pPr>
+            <a:lvl2pPr eaLnBrk="0" hangingPunct="0">
+              <a:defRPr sz="2000">
+                <a:solidFill>
+                  <a:schemeClr val="tx1"/>
+                </a:solidFill>
+                <a:latin typeface="Arial"/>
+                <a:ea typeface="ＭＳ Ｐゴシック" pitchFamily="-106" charset="-128"/>
+              </a:defRPr>
+            </a:lvl2pPr>
+            <a:lvl3pPr marL="1143000" indent="-228600" eaLnBrk="0" hangingPunct="0">
+              <a:defRPr sz="2000">
+                <a:solidFill>
+                  <a:schemeClr val="tx1"/>
+                </a:solidFill>
+                <a:latin typeface="Arial"/>
+                <a:ea typeface="ＭＳ Ｐゴシック" pitchFamily="-106" charset="-128"/>
+              </a:defRPr>
+            </a:lvl3pPr>
+            <a:lvl4pPr marL="1600200" indent="-228600" eaLnBrk="0" hangingPunct="0">
+              <a:defRPr sz="2000">
+                <a:solidFill>
+                  <a:schemeClr val="tx1"/>
+                </a:solidFill>
+                <a:latin typeface="Arial"/>
+                <a:ea typeface="ＭＳ Ｐゴシック" pitchFamily="-106" charset="-128"/>
+              </a:defRPr>
+            </a:lvl4pPr>
+            <a:lvl5pPr marL="2057400" indent="-228600" eaLnBrk="0" hangingPunct="0">
+              <a:defRPr sz="2000">
+                <a:solidFill>
+                  <a:schemeClr val="tx1"/>
+                </a:solidFill>
+                <a:latin typeface="Arial"/>
+                <a:ea typeface="ＭＳ Ｐゴシック" pitchFamily="-106" charset="-128"/>
+              </a:defRPr>
+            </a:lvl5pPr>
+            <a:lvl6pPr marL="2514600" indent="-228600" eaLnBrk="0" fontAlgn="base" hangingPunct="0">
+              <a:spcBef>
+                <a:spcPct val="0"/>
+              </a:spcBef>
+              <a:spcAft>
+                <a:spcPct val="0"/>
+              </a:spcAft>
+              <a:defRPr sz="2000">
+                <a:solidFill>
+                  <a:schemeClr val="tx1"/>
+                </a:solidFill>
+                <a:latin typeface="Arial"/>
+                <a:ea typeface="ＭＳ Ｐゴシック" pitchFamily="-106" charset="-128"/>
+              </a:defRPr>
+            </a:lvl6pPr>
+            <a:lvl7pPr marL="2971800" indent="-228600" eaLnBrk="0" fontAlgn="base" hangingPunct="0">
+              <a:spcBef>
+                <a:spcPct val="0"/>
+              </a:spcBef>
+              <a:spcAft>
+                <a:spcPct val="0"/>
+              </a:spcAft>
+              <a:defRPr sz="2000">
+                <a:solidFill>
+                  <a:schemeClr val="tx1"/>
+                </a:solidFill>
+                <a:latin typeface="Arial"/>
+                <a:ea typeface="ＭＳ Ｐゴシック" pitchFamily="-106" charset="-128"/>
+              </a:defRPr>
+            </a:lvl7pPr>
+            <a:lvl8pPr marL="3429000" indent="-228600" eaLnBrk="0" fontAlgn="base" hangingPunct="0">
+              <a:spcBef>
+                <a:spcPct val="0"/>
+              </a:spcBef>
+              <a:spcAft>
+                <a:spcPct val="0"/>
+              </a:spcAft>
+              <a:defRPr sz="2000">
+                <a:solidFill>
+                  <a:schemeClr val="tx1"/>
+                </a:solidFill>
+                <a:latin typeface="Arial"/>
+                <a:ea typeface="ＭＳ Ｐゴシック" pitchFamily="-106" charset="-128"/>
+              </a:defRPr>
+            </a:lvl8pPr>
+            <a:lvl9pPr marL="3886200" indent="-228600" eaLnBrk="0" fontAlgn="base" hangingPunct="0">
+              <a:spcBef>
+                <a:spcPct val="0"/>
+              </a:spcBef>
+              <a:spcAft>
+                <a:spcPct val="0"/>
+              </a:spcAft>
+              <a:defRPr sz="2000">
+                <a:solidFill>
+                  <a:schemeClr val="tx1"/>
+                </a:solidFill>
+                <a:latin typeface="Arial"/>
+                <a:ea typeface="ＭＳ Ｐゴシック" pitchFamily="-106" charset="-128"/>
+              </a:defRPr>
+            </a:lvl9pPr>
+          </a:lstStyle>
+          <a:p>
+            <a:pPr algn="just">
+              <a:lnSpc>
+                <a:spcPct val="110000"/>
+              </a:lnSpc>
+            </a:pPr>
+            <a:r>
+              <a:rPr lang="en-US" sz="3800" dirty="0">
+                <a:effectLst/>
+                <a:latin typeface="Quattrocento Sans" panose="020B0502050000020003" pitchFamily="34" charset="0"/>
+                <a:cs typeface="Arial" pitchFamily="34" charset="0"/>
+              </a:rPr>
+              <a:t>The combined solution involves the implementation of two departments. This approach integrates both system-wide efficiency and targeted relief.</a:t>
+            </a:r>
+          </a:p>
+          <a:p>
+            <a:pPr algn="just">
+              <a:lnSpc>
+                <a:spcPct val="110000"/>
+              </a:lnSpc>
+            </a:pPr>
+            <a:endParaRPr lang="en-US" sz="3800" dirty="0">
+              <a:effectLst/>
+              <a:latin typeface="Quattrocento Sans" panose="020B0502050000020003" pitchFamily="34" charset="0"/>
+              <a:cs typeface="Arial" pitchFamily="34" charset="0"/>
+            </a:endParaRPr>
+          </a:p>
+          <a:p>
+            <a:pPr algn="just">
+              <a:lnSpc>
+                <a:spcPct val="110000"/>
+              </a:lnSpc>
+            </a:pPr>
+            <a:r>
+              <a:rPr lang="en-US" sz="3800" b="1" dirty="0">
+                <a:effectLst/>
+                <a:latin typeface="Quattrocento Sans" panose="020B0502050000020003" pitchFamily="34" charset="0"/>
+                <a:cs typeface="Arial" pitchFamily="34" charset="0"/>
+              </a:rPr>
+              <a:t>Key Metrics: </a:t>
+            </a:r>
+          </a:p>
+          <a:p>
+            <a:pPr marL="571500" indent="-571500" algn="just">
+              <a:lnSpc>
+                <a:spcPct val="110000"/>
+              </a:lnSpc>
+              <a:buFont typeface="Arial" panose="020B0604020202020204" pitchFamily="34" charset="0"/>
+              <a:buChar char="•"/>
+            </a:pPr>
+            <a:r>
+              <a:rPr lang="en-US" sz="3800" dirty="0">
+                <a:effectLst/>
+                <a:latin typeface="Quattrocento Sans" panose="020B0502050000020003" pitchFamily="34" charset="0"/>
+                <a:cs typeface="Arial" pitchFamily="34" charset="0"/>
+              </a:rPr>
+              <a:t>Overall Average Wait Time Reduction: </a:t>
+            </a:r>
+            <a:r>
+              <a:rPr lang="en-US" sz="3800" u="sng" dirty="0">
+                <a:effectLst/>
+                <a:latin typeface="Quattrocento Sans" panose="020B0502050000020003" pitchFamily="34" charset="0"/>
+                <a:cs typeface="Arial" pitchFamily="34" charset="0"/>
+              </a:rPr>
+              <a:t>40 minutes</a:t>
+            </a:r>
+          </a:p>
+          <a:p>
+            <a:pPr marL="571500" indent="-571500" algn="just">
+              <a:lnSpc>
+                <a:spcPct val="110000"/>
+              </a:lnSpc>
+              <a:buFont typeface="Arial" panose="020B0604020202020204" pitchFamily="34" charset="0"/>
+              <a:buChar char="•"/>
+            </a:pPr>
+            <a:r>
+              <a:rPr lang="en-US" sz="3800" dirty="0">
+                <a:effectLst/>
+                <a:latin typeface="Quattrocento Sans" panose="020B0502050000020003" pitchFamily="34" charset="0"/>
+                <a:cs typeface="Arial" pitchFamily="34" charset="0"/>
+              </a:rPr>
+              <a:t>Overall Average Distance to Nearest A&amp;E:</a:t>
+            </a:r>
+          </a:p>
+          <a:p>
+            <a:pPr algn="just">
+              <a:lnSpc>
+                <a:spcPct val="110000"/>
+              </a:lnSpc>
+            </a:pPr>
+            <a:endParaRPr lang="en-US" sz="3800" dirty="0">
+              <a:effectLst/>
+              <a:latin typeface="Quattrocento Sans" panose="020B0502050000020003" pitchFamily="34" charset="0"/>
+              <a:cs typeface="Arial" pitchFamily="34" charset="0"/>
+            </a:endParaRPr>
+          </a:p>
+          <a:p>
+            <a:pPr algn="just">
+              <a:lnSpc>
+                <a:spcPct val="110000"/>
+              </a:lnSpc>
+            </a:pPr>
+            <a:r>
+              <a:rPr lang="en-US" sz="3800" b="1" dirty="0">
+                <a:effectLst/>
+                <a:latin typeface="Quattrocento Sans" panose="020B0502050000020003" pitchFamily="34" charset="0"/>
+                <a:cs typeface="Arial" pitchFamily="34" charset="0"/>
+              </a:rPr>
+              <a:t>Challenges</a:t>
+            </a:r>
+            <a:r>
+              <a:rPr lang="en-US" sz="3800" dirty="0">
+                <a:effectLst/>
+                <a:latin typeface="Quattrocento Sans" panose="020B0502050000020003" pitchFamily="34" charset="0"/>
+                <a:cs typeface="Arial" pitchFamily="34" charset="0"/>
+              </a:rPr>
+              <a:t>: Increased initial investment and resource a location are required to establish two departments.</a:t>
+            </a:r>
+          </a:p>
+        </p:txBody>
+      </p:sp>
+      <p:sp>
+        <p:nvSpPr>
+          <p:cNvPr id="15" name="TextBox 19">
+            <a:extLst>
+              <a:ext uri="{FF2B5EF4-FFF2-40B4-BE49-F238E27FC236}">
+                <a16:creationId xmlns:a16="http://schemas.microsoft.com/office/drawing/2014/main" id="{9C2465B9-BC3A-A48D-6FE3-3F1F14E9DB90}"/>
+              </a:ext>
+            </a:extLst>
+          </p:cNvPr>
+          <p:cNvSpPr txBox="1">
+            <a:spLocks noChangeArrowheads="1"/>
+          </p:cNvSpPr>
+          <p:nvPr/>
+        </p:nvSpPr>
+        <p:spPr bwMode="auto">
+          <a:xfrm>
+            <a:off x="22402800" y="32720345"/>
+            <a:ext cx="8275820" cy="9694433"/>
+          </a:xfrm>
+          <a:prstGeom prst="rect">
+            <a:avLst/>
+          </a:prstGeom>
+          <a:noFill/>
+          <a:ln>
+            <a:noFill/>
+          </a:ln>
+          <a:extLst>
+            <a:ext uri="{909E8E84-426E-40DD-AFC4-6F175D3DCCD1}">
+              <a14:hiddenFill xmlns:a14="http://schemas.microsoft.com/office/drawing/2010/main">
+                <a:solidFill>
+                  <a:srgbClr val="FFFFFF"/>
+                </a:solidFill>
+              </a14:hiddenFill>
+            </a:ext>
+            <a:ext uri="{91240B29-F687-4F45-9708-019B960494DF}">
+              <a14:hiddenLine xmlns:a14="http://schemas.microsoft.com/office/drawing/2010/main" w="9525">
+                <a:solidFill>
+                  <a:srgbClr val="000000"/>
+                </a:solidFill>
+                <a:miter lim="800000"/>
+                <a:headEnd/>
+                <a:tailEnd/>
+              </a14:hiddenLine>
+            </a:ext>
+          </a:extLst>
+        </p:spPr>
+        <p:txBody>
+          <a:bodyPr wrap="square" lIns="68564" tIns="34282" rIns="68564" bIns="34282">
+            <a:spAutoFit/>
+          </a:bodyPr>
+          <a:lstStyle>
+            <a:defPPr>
+              <a:defRPr kern="1200"/>
+            </a:defPPr>
+            <a:lvl1pPr eaLnBrk="0" hangingPunct="0">
+              <a:defRPr sz="2000">
+                <a:solidFill>
+                  <a:schemeClr val="tx1"/>
+                </a:solidFill>
+                <a:latin typeface="Arial"/>
+                <a:ea typeface="ＭＳ Ｐゴシック" pitchFamily="-106" charset="-128"/>
+              </a:defRPr>
+            </a:lvl1pPr>
+            <a:lvl2pPr eaLnBrk="0" hangingPunct="0">
+              <a:defRPr sz="2000">
+                <a:solidFill>
+                  <a:schemeClr val="tx1"/>
+                </a:solidFill>
+                <a:latin typeface="Arial"/>
+                <a:ea typeface="ＭＳ Ｐゴシック" pitchFamily="-106" charset="-128"/>
+              </a:defRPr>
+            </a:lvl2pPr>
+            <a:lvl3pPr marL="1143000" indent="-228600" eaLnBrk="0" hangingPunct="0">
+              <a:defRPr sz="2000">
+                <a:solidFill>
+                  <a:schemeClr val="tx1"/>
+                </a:solidFill>
+                <a:latin typeface="Arial"/>
+                <a:ea typeface="ＭＳ Ｐゴシック" pitchFamily="-106" charset="-128"/>
+              </a:defRPr>
+            </a:lvl3pPr>
+            <a:lvl4pPr marL="1600200" indent="-228600" eaLnBrk="0" hangingPunct="0">
+              <a:defRPr sz="2000">
+                <a:solidFill>
+                  <a:schemeClr val="tx1"/>
+                </a:solidFill>
+                <a:latin typeface="Arial"/>
+                <a:ea typeface="ＭＳ Ｐゴシック" pitchFamily="-106" charset="-128"/>
+              </a:defRPr>
+            </a:lvl4pPr>
+            <a:lvl5pPr marL="2057400" indent="-228600" eaLnBrk="0" hangingPunct="0">
+              <a:defRPr sz="2000">
+                <a:solidFill>
+                  <a:schemeClr val="tx1"/>
+                </a:solidFill>
+                <a:latin typeface="Arial"/>
+                <a:ea typeface="ＭＳ Ｐゴシック" pitchFamily="-106" charset="-128"/>
+              </a:defRPr>
+            </a:lvl5pPr>
+            <a:lvl6pPr marL="2514600" indent="-228600" eaLnBrk="0" fontAlgn="base" hangingPunct="0">
+              <a:spcBef>
+                <a:spcPct val="0"/>
+              </a:spcBef>
+              <a:spcAft>
+                <a:spcPct val="0"/>
+              </a:spcAft>
+              <a:defRPr sz="2000">
+                <a:solidFill>
+                  <a:schemeClr val="tx1"/>
+                </a:solidFill>
+                <a:latin typeface="Arial"/>
+                <a:ea typeface="ＭＳ Ｐゴシック" pitchFamily="-106" charset="-128"/>
+              </a:defRPr>
+            </a:lvl6pPr>
+            <a:lvl7pPr marL="2971800" indent="-228600" eaLnBrk="0" fontAlgn="base" hangingPunct="0">
+              <a:spcBef>
+                <a:spcPct val="0"/>
+              </a:spcBef>
+              <a:spcAft>
+                <a:spcPct val="0"/>
+              </a:spcAft>
+              <a:defRPr sz="2000">
+                <a:solidFill>
+                  <a:schemeClr val="tx1"/>
+                </a:solidFill>
+                <a:latin typeface="Arial"/>
+                <a:ea typeface="ＭＳ Ｐゴシック" pitchFamily="-106" charset="-128"/>
+              </a:defRPr>
+            </a:lvl7pPr>
+            <a:lvl8pPr marL="3429000" indent="-228600" eaLnBrk="0" fontAlgn="base" hangingPunct="0">
+              <a:spcBef>
+                <a:spcPct val="0"/>
+              </a:spcBef>
+              <a:spcAft>
+                <a:spcPct val="0"/>
+              </a:spcAft>
+              <a:defRPr sz="2000">
+                <a:solidFill>
+                  <a:schemeClr val="tx1"/>
+                </a:solidFill>
+                <a:latin typeface="Arial"/>
+                <a:ea typeface="ＭＳ Ｐゴシック" pitchFamily="-106" charset="-128"/>
+              </a:defRPr>
+            </a:lvl8pPr>
+            <a:lvl9pPr marL="3886200" indent="-228600" eaLnBrk="0" fontAlgn="base" hangingPunct="0">
+              <a:spcBef>
+                <a:spcPct val="0"/>
+              </a:spcBef>
+              <a:spcAft>
+                <a:spcPct val="0"/>
+              </a:spcAft>
+              <a:defRPr sz="2000">
+                <a:solidFill>
+                  <a:schemeClr val="tx1"/>
+                </a:solidFill>
+                <a:latin typeface="Arial"/>
+                <a:ea typeface="ＭＳ Ｐゴシック" pitchFamily="-106" charset="-128"/>
+              </a:defRPr>
+            </a:lvl9pPr>
+          </a:lstStyle>
+          <a:p>
+            <a:pPr algn="just">
+              <a:lnSpc>
+                <a:spcPct val="110000"/>
+              </a:lnSpc>
+            </a:pPr>
+            <a:r>
+              <a:rPr lang="en-US" sz="3800" b="1" dirty="0">
+                <a:effectLst/>
+                <a:latin typeface="Quattrocento Sans" panose="020B0502050000020003" pitchFamily="34" charset="0"/>
+                <a:cs typeface="Arial" pitchFamily="34" charset="0"/>
+              </a:rPr>
+              <a:t>Benefits: </a:t>
+            </a:r>
+          </a:p>
+          <a:p>
+            <a:pPr algn="just">
+              <a:lnSpc>
+                <a:spcPct val="110000"/>
+              </a:lnSpc>
+            </a:pPr>
+            <a:endParaRPr lang="en-US" b="1" dirty="0">
+              <a:effectLst/>
+              <a:latin typeface="Quattrocento Sans" panose="020B0502050000020003" pitchFamily="34" charset="0"/>
+              <a:cs typeface="Arial" pitchFamily="34" charset="0"/>
+            </a:endParaRPr>
+          </a:p>
+          <a:p>
+            <a:pPr marL="571500" indent="-571500" algn="just">
+              <a:lnSpc>
+                <a:spcPct val="110000"/>
+              </a:lnSpc>
+              <a:buFont typeface="Arial" panose="020B0604020202020204" pitchFamily="34" charset="0"/>
+              <a:buChar char="•"/>
+            </a:pPr>
+            <a:r>
+              <a:rPr lang="en-US" sz="3800" dirty="0">
+                <a:effectLst/>
+                <a:latin typeface="Quattrocento Sans" panose="020B0502050000020003" pitchFamily="34" charset="0"/>
+                <a:cs typeface="Arial" pitchFamily="34" charset="0"/>
+              </a:rPr>
+              <a:t>Balances system-wide efficiency with equity by providing both universal and targeted benefits.</a:t>
+            </a:r>
+          </a:p>
+          <a:p>
+            <a:pPr algn="just">
+              <a:lnSpc>
+                <a:spcPct val="110000"/>
+              </a:lnSpc>
+            </a:pPr>
+            <a:endParaRPr lang="en-US" sz="3800" dirty="0">
+              <a:effectLst/>
+              <a:latin typeface="Quattrocento Sans" panose="020B0502050000020003" pitchFamily="34" charset="0"/>
+              <a:cs typeface="Arial" pitchFamily="34" charset="0"/>
+            </a:endParaRPr>
+          </a:p>
+          <a:p>
+            <a:pPr marL="571500" indent="-571500" algn="just">
+              <a:lnSpc>
+                <a:spcPct val="110000"/>
+              </a:lnSpc>
+              <a:buFont typeface="Arial" panose="020B0604020202020204" pitchFamily="34" charset="0"/>
+              <a:buChar char="•"/>
+            </a:pPr>
+            <a:r>
+              <a:rPr lang="en-US" sz="3800" dirty="0">
+                <a:effectLst/>
+                <a:latin typeface="Quattrocento Sans" panose="020B0502050000020003" pitchFamily="34" charset="0"/>
+                <a:cs typeface="Arial" pitchFamily="34" charset="0"/>
+              </a:rPr>
+              <a:t>Mitigates the limitations of individual models, ensuring benefits reach both centralized and peripheral patient populations.</a:t>
+            </a:r>
+          </a:p>
+          <a:p>
+            <a:pPr algn="just">
+              <a:lnSpc>
+                <a:spcPct val="110000"/>
+              </a:lnSpc>
+            </a:pPr>
+            <a:endParaRPr lang="en-US" sz="3800" dirty="0">
+              <a:effectLst/>
+              <a:latin typeface="Quattrocento Sans" panose="020B0502050000020003" pitchFamily="34" charset="0"/>
+              <a:cs typeface="Arial" pitchFamily="34" charset="0"/>
+            </a:endParaRPr>
+          </a:p>
+          <a:p>
+            <a:pPr marL="571500" indent="-571500" algn="just">
+              <a:lnSpc>
+                <a:spcPct val="110000"/>
+              </a:lnSpc>
+              <a:buFont typeface="Arial" panose="020B0604020202020204" pitchFamily="34" charset="0"/>
+              <a:buChar char="•"/>
+            </a:pPr>
+            <a:r>
+              <a:rPr lang="en-US" sz="3800" dirty="0">
+                <a:effectLst/>
+                <a:latin typeface="Quattrocento Sans" panose="020B0502050000020003" pitchFamily="34" charset="0"/>
+                <a:cs typeface="Arial" pitchFamily="34" charset="0"/>
+              </a:rPr>
+              <a:t>Promotes a resilient healthcare system by accommodating potential future changes in patient distribution and demand patterns.</a:t>
+            </a:r>
+          </a:p>
+        </p:txBody>
+      </p:sp>
+      <p:pic>
+        <p:nvPicPr>
+          <p:cNvPr id="7" name="Immagine 6">
+            <a:extLst>
+              <a:ext uri="{FF2B5EF4-FFF2-40B4-BE49-F238E27FC236}">
+                <a16:creationId xmlns:a16="http://schemas.microsoft.com/office/drawing/2014/main" id="{21129AE2-AA9E-4DC6-8B32-DC664B611BCC}"/>
+              </a:ext>
+            </a:extLst>
+          </p:cNvPr>
+          <p:cNvPicPr>
+            <a:picLocks noChangeAspect="1"/>
+          </p:cNvPicPr>
+          <p:nvPr/>
+        </p:nvPicPr>
+        <p:blipFill>
+          <a:blip r:embed="rId5"/>
+          <a:stretch>
+            <a:fillRect/>
+          </a:stretch>
+        </p:blipFill>
+        <p:spPr>
+          <a:xfrm>
+            <a:off x="10930859" y="32858658"/>
+            <a:ext cx="11052995" cy="8815410"/>
+          </a:xfrm>
+          <a:prstGeom prst="rect">
+            <a:avLst/>
+          </a:prstGeom>
+        </p:spPr>
+      </p:pic>
     </p:spTree>
   </p:cSld>
   <p:clrMapOvr>

</xml_diff>